<commit_message>
Changed the resources pages and associated files
</commit_message>
<xml_diff>
--- a/assets/downloads/IEEEVR-2025-Slide-Template.pptx
+++ b/assets/downloads/IEEEVR-2025-Slide-Template.pptx
@@ -201,7 +201,7 @@
           <a:p>
             <a:fld id="{DB26F623-E0C5-4FDE-A4F2-7C5DAC1AABA4}" type="datetimeFigureOut">
               <a:rPr lang="fr-FR" smtClean="0"/>
-              <a:t>10/01/2025</a:t>
+              <a:t>16/01/2025</a:t>
             </a:fld>
             <a:endParaRPr lang="fr-FR"/>
           </a:p>
@@ -856,10 +856,10 @@
       </p:sp>
       <p:sp>
         <p:nvSpPr>
-          <p:cNvPr id="7" name="Espace réservé du numéro de diapositive 6">
+          <p:cNvPr id="5" name="Espace réservé du numéro de diapositive 5">
             <a:extLst>
               <a:ext uri="{FF2B5EF4-FFF2-40B4-BE49-F238E27FC236}">
-                <a16:creationId xmlns:a16="http://schemas.microsoft.com/office/drawing/2014/main" id="{339BD1C2-96E7-D911-ED0B-BBC836F1BA79}"/>
+                <a16:creationId xmlns:a16="http://schemas.microsoft.com/office/drawing/2014/main" id="{A9349E29-74DE-9269-9F9A-BCC88990E991}"/>
               </a:ext>
             </a:extLst>
           </p:cNvPr>
@@ -867,16 +867,33 @@
             <a:spLocks noGrp="1"/>
           </p:cNvSpPr>
           <p:nvPr>
-            <p:ph type="sldNum" sz="quarter" idx="12"/>
+            <p:ph type="sldNum" sz="quarter" idx="4"/>
           </p:nvPr>
         </p:nvSpPr>
-        <p:spPr/>
+        <p:spPr>
+          <a:xfrm>
+            <a:off x="11767076" y="6356350"/>
+            <a:ext cx="537895" cy="365125"/>
+          </a:xfrm>
+          <a:prstGeom prst="rect">
+            <a:avLst/>
+          </a:prstGeom>
+        </p:spPr>
         <p:txBody>
-          <a:bodyPr/>
-          <a:lstStyle/>
-          <a:p>
-            <a:fld id="{BA3149D2-3BDC-4F84-BBC5-CF190F571D39}" type="slidenum">
+          <a:bodyPr vert="horz" lIns="91440" tIns="45720" rIns="91440" bIns="45720" rtlCol="0" anchor="ctr"/>
+          <a:lstStyle>
+            <a:lvl1pPr algn="ctr">
+              <a:defRPr sz="1400">
+                <a:solidFill>
+                  <a:schemeClr val="bg1"/>
+                </a:solidFill>
+              </a:defRPr>
+            </a:lvl1pPr>
+          </a:lstStyle>
+          <a:p>
+            <a:fld id="{D6D9993D-A95F-4C31-A083-2F18AEA233A6}" type="slidenum">
               <a:rPr lang="fr-FR" smtClean="0"/>
+              <a:pPr/>
               <a:t>‹N°›</a:t>
             </a:fld>
             <a:endParaRPr lang="fr-FR"/>
@@ -1099,10 +1116,10 @@
       </p:sp>
       <p:sp>
         <p:nvSpPr>
-          <p:cNvPr id="7" name="Espace réservé du numéro de diapositive 6">
+          <p:cNvPr id="5" name="Espace réservé du numéro de diapositive 5">
             <a:extLst>
               <a:ext uri="{FF2B5EF4-FFF2-40B4-BE49-F238E27FC236}">
-                <a16:creationId xmlns:a16="http://schemas.microsoft.com/office/drawing/2014/main" id="{25EAA4A2-F7FA-7F6C-81F6-FC8CB706D075}"/>
+                <a16:creationId xmlns:a16="http://schemas.microsoft.com/office/drawing/2014/main" id="{A152DF80-C963-4B44-EF51-097AC56C1F5B}"/>
               </a:ext>
             </a:extLst>
           </p:cNvPr>
@@ -1110,16 +1127,33 @@
             <a:spLocks noGrp="1"/>
           </p:cNvSpPr>
           <p:nvPr>
-            <p:ph type="sldNum" sz="quarter" idx="12"/>
+            <p:ph type="sldNum" sz="quarter" idx="4"/>
           </p:nvPr>
         </p:nvSpPr>
-        <p:spPr/>
+        <p:spPr>
+          <a:xfrm>
+            <a:off x="11767076" y="6356350"/>
+            <a:ext cx="537895" cy="365125"/>
+          </a:xfrm>
+          <a:prstGeom prst="rect">
+            <a:avLst/>
+          </a:prstGeom>
+        </p:spPr>
         <p:txBody>
-          <a:bodyPr/>
-          <a:lstStyle/>
-          <a:p>
-            <a:fld id="{BA3149D2-3BDC-4F84-BBC5-CF190F571D39}" type="slidenum">
+          <a:bodyPr vert="horz" lIns="91440" tIns="45720" rIns="91440" bIns="45720" rtlCol="0" anchor="ctr"/>
+          <a:lstStyle>
+            <a:lvl1pPr algn="ctr">
+              <a:defRPr sz="1400">
+                <a:solidFill>
+                  <a:schemeClr val="bg1"/>
+                </a:solidFill>
+              </a:defRPr>
+            </a:lvl1pPr>
+          </a:lstStyle>
+          <a:p>
+            <a:fld id="{D6D9993D-A95F-4C31-A083-2F18AEA233A6}" type="slidenum">
               <a:rPr lang="fr-FR" smtClean="0"/>
+              <a:pPr/>
               <a:t>‹N°›</a:t>
             </a:fld>
             <a:endParaRPr lang="fr-FR"/>
@@ -1408,10 +1442,10 @@
       </p:sp>
       <p:sp>
         <p:nvSpPr>
-          <p:cNvPr id="6" name="Espace réservé du numéro de diapositive 5">
+          <p:cNvPr id="4" name="Espace réservé du numéro de diapositive 5">
             <a:extLst>
               <a:ext uri="{FF2B5EF4-FFF2-40B4-BE49-F238E27FC236}">
-                <a16:creationId xmlns:a16="http://schemas.microsoft.com/office/drawing/2014/main" id="{22DD3D09-D8E3-58B6-B28A-85A0980FE29C}"/>
+                <a16:creationId xmlns:a16="http://schemas.microsoft.com/office/drawing/2014/main" id="{61D8AA2E-2B67-62F6-2B7A-A26D75DDCB58}"/>
               </a:ext>
             </a:extLst>
           </p:cNvPr>
@@ -1419,16 +1453,33 @@
             <a:spLocks noGrp="1"/>
           </p:cNvSpPr>
           <p:nvPr>
-            <p:ph type="sldNum" sz="quarter" idx="12"/>
+            <p:ph type="sldNum" sz="quarter" idx="4"/>
           </p:nvPr>
         </p:nvSpPr>
-        <p:spPr/>
+        <p:spPr>
+          <a:xfrm>
+            <a:off x="11767076" y="6356350"/>
+            <a:ext cx="537895" cy="365125"/>
+          </a:xfrm>
+          <a:prstGeom prst="rect">
+            <a:avLst/>
+          </a:prstGeom>
+        </p:spPr>
         <p:txBody>
-          <a:bodyPr/>
-          <a:lstStyle/>
-          <a:p>
-            <a:fld id="{BA3149D2-3BDC-4F84-BBC5-CF190F571D39}" type="slidenum">
+          <a:bodyPr vert="horz" lIns="91440" tIns="45720" rIns="91440" bIns="45720" rtlCol="0" anchor="ctr"/>
+          <a:lstStyle>
+            <a:lvl1pPr algn="ctr">
+              <a:defRPr sz="1400">
+                <a:solidFill>
+                  <a:schemeClr val="bg1"/>
+                </a:solidFill>
+              </a:defRPr>
+            </a:lvl1pPr>
+          </a:lstStyle>
+          <a:p>
+            <a:fld id="{D6D9993D-A95F-4C31-A083-2F18AEA233A6}" type="slidenum">
               <a:rPr lang="fr-FR" smtClean="0"/>
+              <a:pPr/>
               <a:t>‹N°›</a:t>
             </a:fld>
             <a:endParaRPr lang="fr-FR"/>
@@ -1586,10 +1637,10 @@
       </p:sp>
       <p:sp>
         <p:nvSpPr>
-          <p:cNvPr id="6" name="Espace réservé du numéro de diapositive 5">
+          <p:cNvPr id="4" name="Espace réservé du numéro de diapositive 5">
             <a:extLst>
               <a:ext uri="{FF2B5EF4-FFF2-40B4-BE49-F238E27FC236}">
-                <a16:creationId xmlns:a16="http://schemas.microsoft.com/office/drawing/2014/main" id="{18E074A3-35C1-E35D-8BCD-EAE867D71F99}"/>
+                <a16:creationId xmlns:a16="http://schemas.microsoft.com/office/drawing/2014/main" id="{458936CC-A404-D3AF-FCE2-035AEF9FFF26}"/>
               </a:ext>
             </a:extLst>
           </p:cNvPr>
@@ -1597,16 +1648,33 @@
             <a:spLocks noGrp="1"/>
           </p:cNvSpPr>
           <p:nvPr>
-            <p:ph type="sldNum" sz="quarter" idx="12"/>
+            <p:ph type="sldNum" sz="quarter" idx="4"/>
           </p:nvPr>
         </p:nvSpPr>
-        <p:spPr/>
+        <p:spPr>
+          <a:xfrm>
+            <a:off x="11767076" y="6356350"/>
+            <a:ext cx="537895" cy="365125"/>
+          </a:xfrm>
+          <a:prstGeom prst="rect">
+            <a:avLst/>
+          </a:prstGeom>
+        </p:spPr>
         <p:txBody>
-          <a:bodyPr/>
-          <a:lstStyle/>
-          <a:p>
-            <a:fld id="{BA3149D2-3BDC-4F84-BBC5-CF190F571D39}" type="slidenum">
+          <a:bodyPr vert="horz" lIns="91440" tIns="45720" rIns="91440" bIns="45720" rtlCol="0" anchor="ctr"/>
+          <a:lstStyle>
+            <a:lvl1pPr algn="ctr">
+              <a:defRPr sz="1400">
+                <a:solidFill>
+                  <a:schemeClr val="bg1"/>
+                </a:solidFill>
+              </a:defRPr>
+            </a:lvl1pPr>
+          </a:lstStyle>
+          <a:p>
+            <a:fld id="{D6D9993D-A95F-4C31-A083-2F18AEA233A6}" type="slidenum">
               <a:rPr lang="fr-FR" smtClean="0"/>
+              <a:pPr/>
               <a:t>‹N°›</a:t>
             </a:fld>
             <a:endParaRPr lang="fr-FR"/>
@@ -1813,10 +1881,10 @@
       </p:sp>
       <p:sp>
         <p:nvSpPr>
-          <p:cNvPr id="6" name="Espace réservé du numéro de diapositive 5">
+          <p:cNvPr id="4" name="Espace réservé du numéro de diapositive 5">
             <a:extLst>
               <a:ext uri="{FF2B5EF4-FFF2-40B4-BE49-F238E27FC236}">
-                <a16:creationId xmlns:a16="http://schemas.microsoft.com/office/drawing/2014/main" id="{CBA548A8-83D2-5AE7-28C0-9FDFFE8C9936}"/>
+                <a16:creationId xmlns:a16="http://schemas.microsoft.com/office/drawing/2014/main" id="{1D24D31F-6785-1FF6-58F8-7DE6B0B34599}"/>
               </a:ext>
             </a:extLst>
           </p:cNvPr>
@@ -1824,16 +1892,33 @@
             <a:spLocks noGrp="1"/>
           </p:cNvSpPr>
           <p:nvPr>
-            <p:ph type="sldNum" sz="quarter" idx="12"/>
+            <p:ph type="sldNum" sz="quarter" idx="4"/>
           </p:nvPr>
         </p:nvSpPr>
-        <p:spPr/>
+        <p:spPr>
+          <a:xfrm>
+            <a:off x="11767076" y="6356350"/>
+            <a:ext cx="537895" cy="365125"/>
+          </a:xfrm>
+          <a:prstGeom prst="rect">
+            <a:avLst/>
+          </a:prstGeom>
+        </p:spPr>
         <p:txBody>
-          <a:bodyPr/>
-          <a:lstStyle/>
-          <a:p>
-            <a:fld id="{BA3149D2-3BDC-4F84-BBC5-CF190F571D39}" type="slidenum">
+          <a:bodyPr vert="horz" lIns="91440" tIns="45720" rIns="91440" bIns="45720" rtlCol="0" anchor="ctr"/>
+          <a:lstStyle>
+            <a:lvl1pPr algn="ctr">
+              <a:defRPr sz="1400">
+                <a:solidFill>
+                  <a:schemeClr val="bg1"/>
+                </a:solidFill>
+              </a:defRPr>
+            </a:lvl1pPr>
+          </a:lstStyle>
+          <a:p>
+            <a:fld id="{D6D9993D-A95F-4C31-A083-2F18AEA233A6}" type="slidenum">
               <a:rPr lang="fr-FR" smtClean="0"/>
+              <a:pPr/>
               <a:t>‹N°›</a:t>
             </a:fld>
             <a:endParaRPr lang="fr-FR"/>
@@ -2038,10 +2123,10 @@
       </p:sp>
       <p:sp>
         <p:nvSpPr>
-          <p:cNvPr id="7" name="Espace réservé du numéro de diapositive 6">
+          <p:cNvPr id="5" name="Espace réservé du numéro de diapositive 5">
             <a:extLst>
               <a:ext uri="{FF2B5EF4-FFF2-40B4-BE49-F238E27FC236}">
-                <a16:creationId xmlns:a16="http://schemas.microsoft.com/office/drawing/2014/main" id="{D578411F-1D67-E014-AC8E-99F112372026}"/>
+                <a16:creationId xmlns:a16="http://schemas.microsoft.com/office/drawing/2014/main" id="{4163DEFA-3BB5-D072-5566-D2760F4FA27D}"/>
               </a:ext>
             </a:extLst>
           </p:cNvPr>
@@ -2049,16 +2134,33 @@
             <a:spLocks noGrp="1"/>
           </p:cNvSpPr>
           <p:nvPr>
-            <p:ph type="sldNum" sz="quarter" idx="12"/>
+            <p:ph type="sldNum" sz="quarter" idx="4"/>
           </p:nvPr>
         </p:nvSpPr>
-        <p:spPr/>
+        <p:spPr>
+          <a:xfrm>
+            <a:off x="11767076" y="6356350"/>
+            <a:ext cx="537895" cy="365125"/>
+          </a:xfrm>
+          <a:prstGeom prst="rect">
+            <a:avLst/>
+          </a:prstGeom>
+        </p:spPr>
         <p:txBody>
-          <a:bodyPr/>
-          <a:lstStyle/>
-          <a:p>
-            <a:fld id="{BA3149D2-3BDC-4F84-BBC5-CF190F571D39}" type="slidenum">
+          <a:bodyPr vert="horz" lIns="91440" tIns="45720" rIns="91440" bIns="45720" rtlCol="0" anchor="ctr"/>
+          <a:lstStyle>
+            <a:lvl1pPr algn="ctr">
+              <a:defRPr sz="1400">
+                <a:solidFill>
+                  <a:schemeClr val="bg1"/>
+                </a:solidFill>
+              </a:defRPr>
+            </a:lvl1pPr>
+          </a:lstStyle>
+          <a:p>
+            <a:fld id="{D6D9993D-A95F-4C31-A083-2F18AEA233A6}" type="slidenum">
               <a:rPr lang="fr-FR" smtClean="0"/>
+              <a:pPr/>
               <a:t>‹N°›</a:t>
             </a:fld>
             <a:endParaRPr lang="fr-FR"/>
@@ -2411,10 +2513,10 @@
       </p:sp>
       <p:sp>
         <p:nvSpPr>
-          <p:cNvPr id="9" name="Espace réservé du numéro de diapositive 8">
+          <p:cNvPr id="7" name="Espace réservé du numéro de diapositive 5">
             <a:extLst>
               <a:ext uri="{FF2B5EF4-FFF2-40B4-BE49-F238E27FC236}">
-                <a16:creationId xmlns:a16="http://schemas.microsoft.com/office/drawing/2014/main" id="{AF0D57E5-8EC3-B5B3-FA74-25DE3D26B5C8}"/>
+                <a16:creationId xmlns:a16="http://schemas.microsoft.com/office/drawing/2014/main" id="{12477DC9-BE07-F957-7E9D-9C44DC9B5539}"/>
               </a:ext>
             </a:extLst>
           </p:cNvPr>
@@ -2422,16 +2524,33 @@
             <a:spLocks noGrp="1"/>
           </p:cNvSpPr>
           <p:nvPr>
-            <p:ph type="sldNum" sz="quarter" idx="12"/>
+            <p:ph type="sldNum" sz="quarter" idx="10"/>
           </p:nvPr>
         </p:nvSpPr>
-        <p:spPr/>
+        <p:spPr>
+          <a:xfrm>
+            <a:off x="11767076" y="6356350"/>
+            <a:ext cx="537895" cy="365125"/>
+          </a:xfrm>
+          <a:prstGeom prst="rect">
+            <a:avLst/>
+          </a:prstGeom>
+        </p:spPr>
         <p:txBody>
-          <a:bodyPr/>
-          <a:lstStyle/>
-          <a:p>
-            <a:fld id="{BA3149D2-3BDC-4F84-BBC5-CF190F571D39}" type="slidenum">
+          <a:bodyPr vert="horz" lIns="91440" tIns="45720" rIns="91440" bIns="45720" rtlCol="0" anchor="ctr"/>
+          <a:lstStyle>
+            <a:lvl1pPr algn="ctr">
+              <a:defRPr sz="1400">
+                <a:solidFill>
+                  <a:schemeClr val="bg1"/>
+                </a:solidFill>
+              </a:defRPr>
+            </a:lvl1pPr>
+          </a:lstStyle>
+          <a:p>
+            <a:fld id="{D6D9993D-A95F-4C31-A083-2F18AEA233A6}" type="slidenum">
               <a:rPr lang="fr-FR" smtClean="0"/>
+              <a:pPr/>
               <a:t>‹N°›</a:t>
             </a:fld>
             <a:endParaRPr lang="fr-FR"/>
@@ -2506,10 +2625,10 @@
       </p:sp>
       <p:sp>
         <p:nvSpPr>
-          <p:cNvPr id="5" name="Espace réservé du numéro de diapositive 4">
+          <p:cNvPr id="3" name="Espace réservé du numéro de diapositive 5">
             <a:extLst>
               <a:ext uri="{FF2B5EF4-FFF2-40B4-BE49-F238E27FC236}">
-                <a16:creationId xmlns:a16="http://schemas.microsoft.com/office/drawing/2014/main" id="{B13F6CAF-CF6F-A1DA-D96C-0C0F81BD49D7}"/>
+                <a16:creationId xmlns:a16="http://schemas.microsoft.com/office/drawing/2014/main" id="{0A42E915-E647-8993-E61F-9AEA3BB82E44}"/>
               </a:ext>
             </a:extLst>
           </p:cNvPr>
@@ -2517,16 +2636,33 @@
             <a:spLocks noGrp="1"/>
           </p:cNvSpPr>
           <p:nvPr>
-            <p:ph type="sldNum" sz="quarter" idx="12"/>
+            <p:ph type="sldNum" sz="quarter" idx="4"/>
           </p:nvPr>
         </p:nvSpPr>
-        <p:spPr/>
+        <p:spPr>
+          <a:xfrm>
+            <a:off x="11767076" y="6356350"/>
+            <a:ext cx="537895" cy="365125"/>
+          </a:xfrm>
+          <a:prstGeom prst="rect">
+            <a:avLst/>
+          </a:prstGeom>
+        </p:spPr>
         <p:txBody>
-          <a:bodyPr/>
-          <a:lstStyle/>
-          <a:p>
-            <a:fld id="{BA3149D2-3BDC-4F84-BBC5-CF190F571D39}" type="slidenum">
+          <a:bodyPr vert="horz" lIns="91440" tIns="45720" rIns="91440" bIns="45720" rtlCol="0" anchor="ctr"/>
+          <a:lstStyle>
+            <a:lvl1pPr algn="ctr">
+              <a:defRPr sz="1400">
+                <a:solidFill>
+                  <a:schemeClr val="bg1"/>
+                </a:solidFill>
+              </a:defRPr>
+            </a:lvl1pPr>
+          </a:lstStyle>
+          <a:p>
+            <a:fld id="{D6D9993D-A95F-4C31-A083-2F18AEA233A6}" type="slidenum">
               <a:rPr lang="fr-FR" smtClean="0"/>
+              <a:pPr/>
               <a:t>‹N°›</a:t>
             </a:fld>
             <a:endParaRPr lang="fr-FR"/>
@@ -2565,10 +2701,10 @@
       </p:grpSpPr>
       <p:sp>
         <p:nvSpPr>
-          <p:cNvPr id="4" name="Espace réservé du numéro de diapositive 3">
+          <p:cNvPr id="2" name="Espace réservé du numéro de diapositive 5">
             <a:extLst>
               <a:ext uri="{FF2B5EF4-FFF2-40B4-BE49-F238E27FC236}">
-                <a16:creationId xmlns:a16="http://schemas.microsoft.com/office/drawing/2014/main" id="{C95735A2-289B-D590-9464-814F331A0C35}"/>
+                <a16:creationId xmlns:a16="http://schemas.microsoft.com/office/drawing/2014/main" id="{A1492154-7F5F-F764-6726-A68B99EB732D}"/>
               </a:ext>
             </a:extLst>
           </p:cNvPr>
@@ -2576,16 +2712,33 @@
             <a:spLocks noGrp="1"/>
           </p:cNvSpPr>
           <p:nvPr>
-            <p:ph type="sldNum" sz="quarter" idx="12"/>
+            <p:ph type="sldNum" sz="quarter" idx="4"/>
           </p:nvPr>
         </p:nvSpPr>
-        <p:spPr/>
+        <p:spPr>
+          <a:xfrm>
+            <a:off x="11767076" y="6356350"/>
+            <a:ext cx="537895" cy="365125"/>
+          </a:xfrm>
+          <a:prstGeom prst="rect">
+            <a:avLst/>
+          </a:prstGeom>
+        </p:spPr>
         <p:txBody>
-          <a:bodyPr/>
-          <a:lstStyle/>
-          <a:p>
-            <a:fld id="{BA3149D2-3BDC-4F84-BBC5-CF190F571D39}" type="slidenum">
+          <a:bodyPr vert="horz" lIns="91440" tIns="45720" rIns="91440" bIns="45720" rtlCol="0" anchor="ctr"/>
+          <a:lstStyle>
+            <a:lvl1pPr algn="ctr">
+              <a:defRPr sz="1400">
+                <a:solidFill>
+                  <a:schemeClr val="bg1"/>
+                </a:solidFill>
+              </a:defRPr>
+            </a:lvl1pPr>
+          </a:lstStyle>
+          <a:p>
+            <a:fld id="{D6D9993D-A95F-4C31-A083-2F18AEA233A6}" type="slidenum">
               <a:rPr lang="fr-FR" smtClean="0"/>
+              <a:pPr/>
               <a:t>‹N°›</a:t>
             </a:fld>
             <a:endParaRPr lang="fr-FR"/>
@@ -2632,7 +2785,7 @@
           <p:cNvPr id="5" name="Image 4" descr="Une image contenant texte, capture d’écran, graphisme, ciel&#10;&#10;Description générée automatiquement">
             <a:extLst>
               <a:ext uri="{FF2B5EF4-FFF2-40B4-BE49-F238E27FC236}">
-                <a16:creationId xmlns:a16="http://schemas.microsoft.com/office/drawing/2014/main" id="{FCE93F14-E935-9D44-45ED-910E8D38AB80}"/>
+                <a16:creationId xmlns:a16="http://schemas.microsoft.com/office/drawing/2014/main" id="{7D5655D7-4199-7071-65A7-D9E30020E3D4}"/>
               </a:ext>
             </a:extLst>
           </p:cNvPr>
@@ -2786,7 +2939,7 @@
         </p:nvSpPr>
         <p:spPr>
           <a:xfrm>
-            <a:off x="11687174" y="6356350"/>
+            <a:off x="11767076" y="6356350"/>
             <a:ext cx="537895" cy="365125"/>
           </a:xfrm>
           <a:prstGeom prst="rect">
@@ -2797,7 +2950,7 @@
           <a:bodyPr vert="horz" lIns="91440" tIns="45720" rIns="91440" bIns="45720" rtlCol="0" anchor="ctr"/>
           <a:lstStyle>
             <a:lvl1pPr algn="ctr">
-              <a:defRPr sz="1600">
+              <a:defRPr sz="1400">
                 <a:solidFill>
                   <a:schemeClr val="bg1"/>
                 </a:solidFill>
@@ -3136,7 +3289,7 @@
           <p:cNvPr id="6" name="Image 5" descr="Une image contenant texte, ciel, graphisme, capture d’écran&#10;&#10;Description générée automatiquement">
             <a:extLst>
               <a:ext uri="{FF2B5EF4-FFF2-40B4-BE49-F238E27FC236}">
-                <a16:creationId xmlns:a16="http://schemas.microsoft.com/office/drawing/2014/main" id="{10AF8613-0B38-9087-C93D-4AF050261348}"/>
+                <a16:creationId xmlns:a16="http://schemas.microsoft.com/office/drawing/2014/main" id="{C7FF5C63-C13F-14EF-01EC-F855D94FB6DE}"/>
               </a:ext>
             </a:extLst>
           </p:cNvPr>
@@ -3591,10 +3744,10 @@
       </p:grpSpPr>
       <p:pic>
         <p:nvPicPr>
-          <p:cNvPr id="5" name="Image 4" descr="Une image contenant texte, capture d’écran, insecte, graphisme&#10;&#10;Description générée automatiquement">
+          <p:cNvPr id="5" name="Image 4" descr="Une image contenant texte, capture d’écran, graphisme, enveloppe&#10;&#10;Description générée automatiquement">
             <a:extLst>
               <a:ext uri="{FF2B5EF4-FFF2-40B4-BE49-F238E27FC236}">
-                <a16:creationId xmlns:a16="http://schemas.microsoft.com/office/drawing/2014/main" id="{553B8349-9597-7C97-9EF5-A224B9471EC0}"/>
+                <a16:creationId xmlns:a16="http://schemas.microsoft.com/office/drawing/2014/main" id="{8523A500-6717-F14D-E489-EE2E33758C79}"/>
               </a:ext>
             </a:extLst>
           </p:cNvPr>
@@ -3732,10 +3885,10 @@
       </p:sp>
       <p:sp>
         <p:nvSpPr>
-          <p:cNvPr id="6" name="Espace réservé du numéro de diapositive 5">
+          <p:cNvPr id="9" name="Espace réservé du numéro de diapositive 5">
             <a:extLst>
               <a:ext uri="{FF2B5EF4-FFF2-40B4-BE49-F238E27FC236}">
-                <a16:creationId xmlns:a16="http://schemas.microsoft.com/office/drawing/2014/main" id="{B97BF88C-34CC-1880-B42C-7D88CCF20C21}"/>
+                <a16:creationId xmlns:a16="http://schemas.microsoft.com/office/drawing/2014/main" id="{BF105360-6E9E-6F65-45FC-EC135F18BB5C}"/>
               </a:ext>
             </a:extLst>
           </p:cNvPr>
@@ -3748,8 +3901,8 @@
         </p:nvSpPr>
         <p:spPr>
           <a:xfrm>
-            <a:off x="11701964" y="6356350"/>
-            <a:ext cx="518611" cy="365125"/>
+            <a:off x="11767076" y="6356350"/>
+            <a:ext cx="537895" cy="365125"/>
           </a:xfrm>
           <a:prstGeom prst="rect">
             <a:avLst/>
@@ -3759,7 +3912,7 @@
           <a:bodyPr vert="horz" lIns="91440" tIns="45720" rIns="91440" bIns="45720" rtlCol="0" anchor="ctr"/>
           <a:lstStyle>
             <a:lvl1pPr algn="ctr">
-              <a:defRPr sz="1600">
+              <a:defRPr sz="1400">
                 <a:solidFill>
                   <a:schemeClr val="bg1"/>
                 </a:solidFill>
@@ -3767,7 +3920,7 @@
             </a:lvl1pPr>
           </a:lstStyle>
           <a:p>
-            <a:fld id="{BA3149D2-3BDC-4F84-BBC5-CF190F571D39}" type="slidenum">
+            <a:fld id="{D6D9993D-A95F-4C31-A083-2F18AEA233A6}" type="slidenum">
               <a:rPr lang="fr-FR" smtClean="0"/>
               <a:pPr/>
               <a:t>‹N°›</a:t>
@@ -4337,10 +4490,10 @@
       </p:sp>
       <p:sp>
         <p:nvSpPr>
-          <p:cNvPr id="4" name="Espace réservé du numéro de diapositive 3">
+          <p:cNvPr id="5" name="Espace réservé du numéro de diapositive 5">
             <a:extLst>
               <a:ext uri="{FF2B5EF4-FFF2-40B4-BE49-F238E27FC236}">
-                <a16:creationId xmlns:a16="http://schemas.microsoft.com/office/drawing/2014/main" id="{C6971680-EFEA-D4D6-FFCE-63F5B7D63770}"/>
+                <a16:creationId xmlns:a16="http://schemas.microsoft.com/office/drawing/2014/main" id="{EEDC34C0-E894-E92A-ADA7-89D3B79BB309}"/>
               </a:ext>
             </a:extLst>
           </p:cNvPr>
@@ -4348,19 +4501,36 @@
             <a:spLocks noGrp="1"/>
           </p:cNvSpPr>
           <p:nvPr>
-            <p:ph type="sldNum" sz="quarter" idx="12"/>
+            <p:ph type="sldNum" sz="quarter" idx="4"/>
           </p:nvPr>
         </p:nvSpPr>
-        <p:spPr/>
+        <p:spPr>
+          <a:xfrm>
+            <a:off x="11767076" y="6356350"/>
+            <a:ext cx="537895" cy="365125"/>
+          </a:xfrm>
+          <a:prstGeom prst="rect">
+            <a:avLst/>
+          </a:prstGeom>
+        </p:spPr>
         <p:txBody>
-          <a:bodyPr/>
-          <a:lstStyle/>
-          <a:p>
-            <a:fld id="{BA3149D2-3BDC-4F84-BBC5-CF190F571D39}" type="slidenum">
+          <a:bodyPr vert="horz" lIns="91440" tIns="45720" rIns="91440" bIns="45720" rtlCol="0" anchor="ctr"/>
+          <a:lstStyle>
+            <a:lvl1pPr algn="ctr">
+              <a:defRPr sz="1400">
+                <a:solidFill>
+                  <a:schemeClr val="bg1"/>
+                </a:solidFill>
+              </a:defRPr>
+            </a:lvl1pPr>
+          </a:lstStyle>
+          <a:p>
+            <a:fld id="{D6D9993D-A95F-4C31-A083-2F18AEA233A6}" type="slidenum">
               <a:rPr lang="fr-FR" smtClean="0"/>
+              <a:pPr/>
               <a:t>3</a:t>
             </a:fld>
-            <a:endParaRPr lang="fr-FR"/>
+            <a:endParaRPr lang="fr-FR" dirty="0"/>
           </a:p>
         </p:txBody>
       </p:sp>

</xml_diff>